<commit_message>
updated with more images
</commit_message>
<xml_diff>
--- a/PosterTemplate For Colloquium 2018.pptx
+++ b/PosterTemplate For Colloquium 2018.pptx
@@ -2653,7 +2653,7 @@
         <p:spPr>
           <a:xfrm>
             <a:off x="14211300" y="5767577"/>
-            <a:ext cx="14546580" cy="20036254"/>
+            <a:ext cx="14546580" cy="25206900"/>
           </a:xfrm>
           <a:prstGeom prst="rect">
             <a:avLst/>
@@ -2723,6 +2723,39 @@
             <a:endParaRPr lang="en-US" dirty="0"/>
           </a:p>
           <a:p>
+            <a:endParaRPr lang="en-US" dirty="0"/>
+          </a:p>
+          <a:p>
+            <a:endParaRPr lang="en-US" dirty="0"/>
+          </a:p>
+          <a:p>
+            <a:endParaRPr lang="en-US" dirty="0"/>
+          </a:p>
+          <a:p>
+            <a:endParaRPr lang="en-US" dirty="0"/>
+          </a:p>
+          <a:p>
+            <a:endParaRPr lang="en-US" dirty="0"/>
+          </a:p>
+          <a:p>
+            <a:endParaRPr lang="en-US" dirty="0"/>
+          </a:p>
+          <a:p>
+            <a:endParaRPr lang="en-US" dirty="0"/>
+          </a:p>
+          <a:p>
+            <a:endParaRPr lang="en-US" dirty="0"/>
+          </a:p>
+          <a:p>
+            <a:endParaRPr lang="en-US" dirty="0"/>
+          </a:p>
+          <a:p>
+            <a:endParaRPr lang="en-US" dirty="0"/>
+          </a:p>
+          <a:p>
+            <a:endParaRPr lang="en-US" dirty="0"/>
+          </a:p>
+          <a:p>
             <a:r>
               <a:rPr lang="en-US" dirty="0"/>
               <a:t>Key features of CNN:</a:t>
@@ -2731,22 +2764,13 @@
           <a:p>
             <a:r>
               <a:rPr lang="en-US" dirty="0"/>
-              <a:t>	Dropout: Randomly ignoring neuron nodes during the training phase to prevent overfitting in the fully connected layer</a:t>
+              <a:t>	Dropout: Randomly ignoring neuron nodes during the training phase to prevent overfitting</a:t>
             </a:r>
           </a:p>
           <a:p>
             <a:r>
               <a:rPr lang="en-US" dirty="0"/>
-              <a:t>	Estimator API: allows for high-level implementation of machine learning models while maintaining simplicity</a:t>
-            </a:r>
-          </a:p>
-          <a:p>
-            <a:endParaRPr lang="en-US" dirty="0"/>
-          </a:p>
-          <a:p>
-            <a:r>
-              <a:rPr lang="en-US" dirty="0"/>
-              <a:t>	</a:t>
+              <a:t>	Estimator API: Allows for high-level implementation of machine learning model	</a:t>
             </a:r>
           </a:p>
           <a:p>
@@ -2804,7 +2828,7 @@
         <p:spPr>
           <a:xfrm>
             <a:off x="29962222" y="5932165"/>
-            <a:ext cx="13218102" cy="20036254"/>
+            <a:ext cx="13218102" cy="22252245"/>
           </a:xfrm>
           <a:prstGeom prst="rect">
             <a:avLst/>
@@ -2828,15 +2852,6 @@
             </a:r>
           </a:p>
           <a:p>
-            <a:endParaRPr lang="en-US" dirty="0"/>
-          </a:p>
-          <a:p>
-            <a:r>
-              <a:rPr lang="en-US" dirty="0"/>
-              <a:t>(Place output graphs showing accuracy)</a:t>
-            </a:r>
-          </a:p>
-          <a:p>
             <a:r>
               <a:rPr lang="en-US" dirty="0"/>
               <a:t> </a:t>
@@ -2852,52 +2867,61 @@
             <a:endParaRPr lang="en-US" dirty="0"/>
           </a:p>
           <a:p>
+            <a:endParaRPr lang="en-US" dirty="0"/>
+          </a:p>
+          <a:p>
+            <a:endParaRPr lang="en-US" dirty="0"/>
+          </a:p>
+          <a:p>
+            <a:endParaRPr lang="en-US" dirty="0"/>
+          </a:p>
+          <a:p>
+            <a:endParaRPr lang="en-US" dirty="0"/>
+          </a:p>
+          <a:p>
+            <a:endParaRPr lang="en-US" dirty="0"/>
+          </a:p>
+          <a:p>
+            <a:endParaRPr lang="en-US" dirty="0"/>
+          </a:p>
+          <a:p>
+            <a:endParaRPr lang="en-US" dirty="0"/>
+          </a:p>
+          <a:p>
+            <a:endParaRPr lang="en-US" dirty="0"/>
+          </a:p>
+          <a:p>
+            <a:endParaRPr lang="en-US" dirty="0"/>
+          </a:p>
+          <a:p>
+            <a:endParaRPr lang="en-US" dirty="0"/>
+          </a:p>
+          <a:p>
+            <a:endParaRPr lang="en-US" dirty="0"/>
+          </a:p>
+          <a:p>
+            <a:endParaRPr lang="en-US" dirty="0"/>
+          </a:p>
+          <a:p>
+            <a:endParaRPr lang="en-US" dirty="0"/>
+          </a:p>
+          <a:p>
+            <a:endParaRPr lang="en-US" dirty="0"/>
+          </a:p>
+          <a:p>
+            <a:endParaRPr lang="en-US" dirty="0"/>
+          </a:p>
+          <a:p>
             <a:r>
               <a:rPr lang="en-US" dirty="0"/>
               <a:t>Adversarial Phase:</a:t>
             </a:r>
           </a:p>
           <a:p>
-            <a:endParaRPr lang="en-US" dirty="0"/>
-          </a:p>
-          <a:p>
-            <a:endParaRPr lang="en-US" dirty="0"/>
-          </a:p>
-          <a:p>
-            <a:endParaRPr lang="en-US" dirty="0"/>
-          </a:p>
-          <a:p>
-            <a:endParaRPr lang="en-US" dirty="0"/>
-          </a:p>
-          <a:p>
-            <a:endParaRPr lang="en-US" dirty="0"/>
-          </a:p>
-          <a:p>
-            <a:endParaRPr lang="en-US" dirty="0"/>
-          </a:p>
-          <a:p>
-            <a:endParaRPr lang="en-US" dirty="0"/>
-          </a:p>
-          <a:p>
             <a:r>
               <a:rPr lang="en-US" dirty="0"/>
-              <a:t>Gaussian Noise:</a:t>
-            </a:r>
-          </a:p>
-          <a:p>
-            <a:r>
-              <a:rPr lang="en-US" dirty="0"/>
-              <a:t>	Probability density function to generate the noise within the images</a:t>
-            </a:r>
-          </a:p>
-          <a:p>
-            <a:r>
-              <a:rPr lang="en-US" dirty="0"/>
-              <a:t>	(Sample picture(s) with noise added)</a:t>
-            </a:r>
-          </a:p>
-          <a:p>
-            <a:endParaRPr lang="en-US" dirty="0"/>
+              <a:t>	Gaussian noise for image manipulation</a:t>
+            </a:r>
           </a:p>
           <a:p>
             <a:r>
@@ -3166,6 +3190,204 @@
           </a:extLst>
         </p:spPr>
       </p:pic>
+      <p:pic>
+        <p:nvPicPr>
+          <p:cNvPr id="5" name="Picture 4">
+            <a:extLst>
+              <a:ext uri="{FF2B5EF4-FFF2-40B4-BE49-F238E27FC236}">
+                <a16:creationId xmlns:a16="http://schemas.microsoft.com/office/drawing/2014/main" id="{49D93F82-0F99-4498-BF0D-35D4A14B47BB}"/>
+              </a:ext>
+            </a:extLst>
+          </p:cNvPr>
+          <p:cNvPicPr>
+            <a:picLocks noChangeAspect="1"/>
+          </p:cNvPicPr>
+          <p:nvPr/>
+        </p:nvPicPr>
+        <p:blipFill>
+          <a:blip r:embed="rId10"/>
+          <a:stretch>
+            <a:fillRect/>
+          </a:stretch>
+        </p:blipFill>
+        <p:spPr>
+          <a:xfrm>
+            <a:off x="29608150" y="8294155"/>
+            <a:ext cx="13787750" cy="5325592"/>
+          </a:xfrm>
+          <a:prstGeom prst="rect">
+            <a:avLst/>
+          </a:prstGeom>
+        </p:spPr>
+      </p:pic>
+      <p:sp>
+        <p:nvSpPr>
+          <p:cNvPr id="21" name="TextBox 20">
+            <a:extLst>
+              <a:ext uri="{FF2B5EF4-FFF2-40B4-BE49-F238E27FC236}">
+                <a16:creationId xmlns:a16="http://schemas.microsoft.com/office/drawing/2014/main" id="{75A4509F-440C-4187-A34B-D7D3EFD9CBA0}"/>
+              </a:ext>
+            </a:extLst>
+          </p:cNvPr>
+          <p:cNvSpPr txBox="1"/>
+          <p:nvPr/>
+        </p:nvSpPr>
+        <p:spPr>
+          <a:xfrm>
+            <a:off x="29973911" y="13753140"/>
+            <a:ext cx="14008730" cy="707886"/>
+          </a:xfrm>
+          <a:prstGeom prst="rect">
+            <a:avLst/>
+          </a:prstGeom>
+          <a:noFill/>
+        </p:spPr>
+        <p:txBody>
+          <a:bodyPr wrap="square" rtlCol="0">
+            <a:spAutoFit/>
+          </a:bodyPr>
+          <a:lstStyle/>
+          <a:p>
+            <a:pPr algn="ctr"/>
+            <a:r>
+              <a:rPr lang="en-US" sz="4000" dirty="0"/>
+              <a:t>Figure 3. Accuracy vs. Number of Images trained</a:t>
+            </a:r>
+          </a:p>
+        </p:txBody>
+      </p:sp>
+      <p:pic>
+        <p:nvPicPr>
+          <p:cNvPr id="12" name="Picture 11">
+            <a:extLst>
+              <a:ext uri="{FF2B5EF4-FFF2-40B4-BE49-F238E27FC236}">
+                <a16:creationId xmlns:a16="http://schemas.microsoft.com/office/drawing/2014/main" id="{D20DB261-7480-4BD1-B98A-A779C87484EA}"/>
+              </a:ext>
+            </a:extLst>
+          </p:cNvPr>
+          <p:cNvPicPr>
+            <a:picLocks noChangeAspect="1"/>
+          </p:cNvPicPr>
+          <p:nvPr/>
+        </p:nvPicPr>
+        <p:blipFill>
+          <a:blip r:embed="rId11"/>
+          <a:stretch>
+            <a:fillRect/>
+          </a:stretch>
+        </p:blipFill>
+        <p:spPr>
+          <a:xfrm>
+            <a:off x="29678983" y="14470252"/>
+            <a:ext cx="13540162" cy="5922939"/>
+          </a:xfrm>
+          <a:prstGeom prst="rect">
+            <a:avLst/>
+          </a:prstGeom>
+        </p:spPr>
+      </p:pic>
+      <p:sp>
+        <p:nvSpPr>
+          <p:cNvPr id="24" name="TextBox 23">
+            <a:extLst>
+              <a:ext uri="{FF2B5EF4-FFF2-40B4-BE49-F238E27FC236}">
+                <a16:creationId xmlns:a16="http://schemas.microsoft.com/office/drawing/2014/main" id="{0CAEC994-0271-4A49-A482-C079A1F6D40A}"/>
+              </a:ext>
+            </a:extLst>
+          </p:cNvPr>
+          <p:cNvSpPr txBox="1"/>
+          <p:nvPr/>
+        </p:nvSpPr>
+        <p:spPr>
+          <a:xfrm>
+            <a:off x="29779001" y="21002587"/>
+            <a:ext cx="14008730" cy="707886"/>
+          </a:xfrm>
+          <a:prstGeom prst="rect">
+            <a:avLst/>
+          </a:prstGeom>
+          <a:noFill/>
+        </p:spPr>
+        <p:txBody>
+          <a:bodyPr wrap="square" rtlCol="0">
+            <a:spAutoFit/>
+          </a:bodyPr>
+          <a:lstStyle/>
+          <a:p>
+            <a:pPr algn="ctr"/>
+            <a:r>
+              <a:rPr lang="en-US" sz="4000" dirty="0"/>
+              <a:t>Figure 4. Computed loss vs. Number of Images trained</a:t>
+            </a:r>
+          </a:p>
+        </p:txBody>
+      </p:sp>
+      <p:pic>
+        <p:nvPicPr>
+          <p:cNvPr id="16" name="Picture 15">
+            <a:extLst>
+              <a:ext uri="{FF2B5EF4-FFF2-40B4-BE49-F238E27FC236}">
+                <a16:creationId xmlns:a16="http://schemas.microsoft.com/office/drawing/2014/main" id="{0E05EF88-01AA-48A7-9DEB-16B4D28DA37F}"/>
+              </a:ext>
+            </a:extLst>
+          </p:cNvPr>
+          <p:cNvPicPr>
+            <a:picLocks noChangeAspect="1"/>
+          </p:cNvPicPr>
+          <p:nvPr/>
+        </p:nvPicPr>
+        <p:blipFill>
+          <a:blip r:embed="rId12"/>
+          <a:stretch>
+            <a:fillRect/>
+          </a:stretch>
+        </p:blipFill>
+        <p:spPr>
+          <a:xfrm>
+            <a:off x="14211295" y="17634370"/>
+            <a:ext cx="13221168" cy="8461548"/>
+          </a:xfrm>
+          <a:prstGeom prst="rect">
+            <a:avLst/>
+          </a:prstGeom>
+        </p:spPr>
+      </p:pic>
+      <p:sp>
+        <p:nvSpPr>
+          <p:cNvPr id="17" name="TextBox 16">
+            <a:extLst>
+              <a:ext uri="{FF2B5EF4-FFF2-40B4-BE49-F238E27FC236}">
+                <a16:creationId xmlns:a16="http://schemas.microsoft.com/office/drawing/2014/main" id="{57568E3B-CADF-494B-9007-BD21D3AF761A}"/>
+              </a:ext>
+            </a:extLst>
+          </p:cNvPr>
+          <p:cNvSpPr txBox="1"/>
+          <p:nvPr/>
+        </p:nvSpPr>
+        <p:spPr>
+          <a:xfrm>
+            <a:off x="14118318" y="25332935"/>
+            <a:ext cx="15396851" cy="707886"/>
+          </a:xfrm>
+          <a:prstGeom prst="rect">
+            <a:avLst/>
+          </a:prstGeom>
+          <a:noFill/>
+        </p:spPr>
+        <p:txBody>
+          <a:bodyPr wrap="square" rtlCol="0">
+            <a:spAutoFit/>
+          </a:bodyPr>
+          <a:lstStyle/>
+          <a:p>
+            <a:pPr algn="ctr"/>
+            <a:r>
+              <a:rPr lang="en-US" sz="4000" dirty="0"/>
+              <a:t>Figure 2. Output of filters of the primary layer</a:t>
+            </a:r>
+          </a:p>
+        </p:txBody>
+      </p:sp>
     </p:spTree>
   </p:cSld>
   <p:clrMapOvr>

</xml_diff>

<commit_message>
Uploaded final poster in pdf and ppt
</commit_message>
<xml_diff>
--- a/PosterTemplate For Colloquium 2018.pptx
+++ b/PosterTemplate For Colloquium 2018.pptx
@@ -11,7 +11,7 @@
     <p:sldId id="256" r:id="rId2"/>
   </p:sldIdLst>
   <p:sldSz cx="43891200" cy="32918400"/>
-  <p:notesSz cx="16002000" cy="21488400"/>
+  <p:notesSz cx="7315200" cy="9601200"/>
   <p:defaultTextStyle>
     <a:defPPr>
       <a:defRPr lang="en-US"/>
@@ -154,12 +154,12 @@
     </p:ext>
     <p:ext uri="{2D200454-40CA-4A62-9FC3-DE9A4176ACB9}">
       <p15:notesGuideLst xmlns:p15="http://schemas.microsoft.com/office/powerpoint/2012/main">
-        <p15:guide id="1" orient="horz" pos="6768">
+        <p15:guide id="1" orient="horz" pos="3024" userDrawn="1">
           <p15:clr>
             <a:srgbClr val="A4A3A4"/>
           </p15:clr>
         </p15:guide>
-        <p15:guide id="2" pos="5040">
+        <p15:guide id="2" pos="2304" userDrawn="1">
           <p15:clr>
             <a:srgbClr val="A4A3A4"/>
           </p15:clr>
@@ -205,7 +205,7 @@
         <p:spPr bwMode="auto">
           <a:xfrm>
             <a:off x="0" y="0"/>
-            <a:ext cx="6934200" cy="1074738"/>
+            <a:ext cx="3169920" cy="480202"/>
           </a:xfrm>
           <a:prstGeom prst="rect">
             <a:avLst/>
@@ -238,14 +238,14 @@
           </a:extLst>
         </p:spPr>
         <p:txBody>
-          <a:bodyPr vert="horz" wrap="square" lIns="214226" tIns="107113" rIns="214226" bIns="107113" numCol="1" anchor="t" anchorCtr="0" compatLnSpc="1">
+          <a:bodyPr vert="horz" wrap="square" lIns="96659" tIns="48329" rIns="96659" bIns="48329" numCol="1" anchor="t" anchorCtr="0" compatLnSpc="1">
             <a:prstTxWarp prst="textNoShape">
               <a:avLst/>
             </a:prstTxWarp>
           </a:bodyPr>
           <a:lstStyle>
-            <a:lvl1pPr defTabSz="2141538" eaLnBrk="0" hangingPunct="0">
-              <a:defRPr sz="2800">
+            <a:lvl1pPr defTabSz="966262" eaLnBrk="0" hangingPunct="0">
+              <a:defRPr sz="1300">
                 <a:ea typeface="ヒラギノ角ゴ Pro W3" charset="0"/>
                 <a:cs typeface="ヒラギノ角ゴ Pro W3" charset="0"/>
               </a:defRPr>
@@ -271,8 +271,8 @@
         </p:nvSpPr>
         <p:spPr bwMode="auto">
           <a:xfrm>
-            <a:off x="9064625" y="0"/>
-            <a:ext cx="6934200" cy="1074738"/>
+            <a:off x="4143829" y="0"/>
+            <a:ext cx="3169920" cy="480202"/>
           </a:xfrm>
           <a:prstGeom prst="rect">
             <a:avLst/>
@@ -305,21 +305,21 @@
           </a:extLst>
         </p:spPr>
         <p:txBody>
-          <a:bodyPr vert="horz" wrap="square" lIns="214226" tIns="107113" rIns="214226" bIns="107113" numCol="1" anchor="t" anchorCtr="0" compatLnSpc="1">
+          <a:bodyPr vert="horz" wrap="square" lIns="96659" tIns="48329" rIns="96659" bIns="48329" numCol="1" anchor="t" anchorCtr="0" compatLnSpc="1">
             <a:prstTxWarp prst="textNoShape">
               <a:avLst/>
             </a:prstTxWarp>
           </a:bodyPr>
           <a:lstStyle>
-            <a:lvl1pPr algn="r" defTabSz="2141538" eaLnBrk="0" hangingPunct="0">
-              <a:defRPr sz="2800"/>
+            <a:lvl1pPr algn="r" defTabSz="966262" eaLnBrk="0" hangingPunct="0">
+              <a:defRPr sz="1300"/>
             </a:lvl1pPr>
           </a:lstStyle>
           <a:p>
             <a:fld id="{7E73EFAA-0D97-8F4A-9275-CE066022233B}" type="datetime1">
               <a:rPr lang="en-US" altLang="en-US"/>
               <a:pPr/>
-              <a:t>4/9/2018</a:t>
+              <a:t>4/10/2018</a:t>
             </a:fld>
             <a:endParaRPr lang="en-US" altLang="en-US"/>
           </a:p>
@@ -337,8 +337,8 @@
         </p:nvSpPr>
         <p:spPr bwMode="auto">
           <a:xfrm>
-            <a:off x="2628900" y="1611313"/>
-            <a:ext cx="10744200" cy="8058150"/>
+            <a:off x="1257300" y="720725"/>
+            <a:ext cx="4800600" cy="3600450"/>
           </a:xfrm>
           <a:prstGeom prst="rect">
             <a:avLst/>
@@ -378,8 +378,8 @@
         </p:nvSpPr>
         <p:spPr bwMode="auto">
           <a:xfrm>
-            <a:off x="1600200" y="10207625"/>
-            <a:ext cx="12801600" cy="9669463"/>
+            <a:off x="731520" y="4560854"/>
+            <a:ext cx="5852160" cy="4320398"/>
           </a:xfrm>
           <a:prstGeom prst="rect">
             <a:avLst/>
@@ -412,7 +412,7 @@
           </a:extLst>
         </p:spPr>
         <p:txBody>
-          <a:bodyPr vert="horz" wrap="square" lIns="214226" tIns="107113" rIns="214226" bIns="107113" numCol="1" anchor="t" anchorCtr="0" compatLnSpc="1">
+          <a:bodyPr vert="horz" wrap="square" lIns="96659" tIns="48329" rIns="96659" bIns="48329" numCol="1" anchor="t" anchorCtr="0" compatLnSpc="1">
             <a:prstTxWarp prst="textNoShape">
               <a:avLst/>
             </a:prstTxWarp>
@@ -467,8 +467,8 @@
         </p:nvSpPr>
         <p:spPr bwMode="auto">
           <a:xfrm>
-            <a:off x="0" y="20410488"/>
-            <a:ext cx="6934200" cy="1074737"/>
+            <a:off x="0" y="9119580"/>
+            <a:ext cx="3169920" cy="480202"/>
           </a:xfrm>
           <a:prstGeom prst="rect">
             <a:avLst/>
@@ -501,14 +501,14 @@
           </a:extLst>
         </p:spPr>
         <p:txBody>
-          <a:bodyPr vert="horz" wrap="square" lIns="214226" tIns="107113" rIns="214226" bIns="107113" numCol="1" anchor="b" anchorCtr="0" compatLnSpc="1">
+          <a:bodyPr vert="horz" wrap="square" lIns="96659" tIns="48329" rIns="96659" bIns="48329" numCol="1" anchor="b" anchorCtr="0" compatLnSpc="1">
             <a:prstTxWarp prst="textNoShape">
               <a:avLst/>
             </a:prstTxWarp>
           </a:bodyPr>
           <a:lstStyle>
-            <a:lvl1pPr defTabSz="2141538" eaLnBrk="0" hangingPunct="0">
-              <a:defRPr sz="2800">
+            <a:lvl1pPr defTabSz="966262" eaLnBrk="0" hangingPunct="0">
+              <a:defRPr sz="1300">
                 <a:ea typeface="ヒラギノ角ゴ Pro W3" charset="0"/>
                 <a:cs typeface="ヒラギノ角ゴ Pro W3" charset="0"/>
               </a:defRPr>
@@ -534,8 +534,8 @@
         </p:nvSpPr>
         <p:spPr bwMode="auto">
           <a:xfrm>
-            <a:off x="9064625" y="20410488"/>
-            <a:ext cx="6934200" cy="1074737"/>
+            <a:off x="4143829" y="9119580"/>
+            <a:ext cx="3169920" cy="480202"/>
           </a:xfrm>
           <a:prstGeom prst="rect">
             <a:avLst/>
@@ -568,14 +568,14 @@
           </a:extLst>
         </p:spPr>
         <p:txBody>
-          <a:bodyPr vert="horz" wrap="square" lIns="214226" tIns="107113" rIns="214226" bIns="107113" numCol="1" anchor="b" anchorCtr="0" compatLnSpc="1">
+          <a:bodyPr vert="horz" wrap="square" lIns="96659" tIns="48329" rIns="96659" bIns="48329" numCol="1" anchor="b" anchorCtr="0" compatLnSpc="1">
             <a:prstTxWarp prst="textNoShape">
               <a:avLst/>
             </a:prstTxWarp>
           </a:bodyPr>
           <a:lstStyle>
-            <a:lvl1pPr algn="r" defTabSz="2141538" eaLnBrk="0" hangingPunct="0">
-              <a:defRPr sz="2800"/>
+            <a:lvl1pPr algn="r" defTabSz="966262" eaLnBrk="0" hangingPunct="0">
+              <a:defRPr sz="1300"/>
             </a:lvl1pPr>
           </a:lstStyle>
           <a:p>
@@ -837,8 +837,8 @@
         <p:txBody>
           <a:bodyPr/>
           <a:lstStyle>
-            <a:lvl1pPr defTabSz="2141538" eaLnBrk="0" hangingPunct="0">
-              <a:defRPr sz="2400">
+            <a:lvl1pPr defTabSz="966262" eaLnBrk="0" hangingPunct="0">
+              <a:defRPr sz="1100">
                 <a:solidFill>
                   <a:schemeClr val="tx1"/>
                 </a:solidFill>
@@ -846,8 +846,8 @@
                 <a:ea typeface="ヒラギノ角ゴ Pro W3" charset="-128"/>
               </a:defRPr>
             </a:lvl1pPr>
-            <a:lvl2pPr marL="742950" indent="-285750" defTabSz="2141538" eaLnBrk="0" hangingPunct="0">
-              <a:defRPr sz="2400">
+            <a:lvl2pPr marL="335219" indent="-128930" defTabSz="966262" eaLnBrk="0" hangingPunct="0">
+              <a:defRPr sz="1100">
                 <a:solidFill>
                   <a:schemeClr val="tx1"/>
                 </a:solidFill>
@@ -855,8 +855,8 @@
                 <a:ea typeface="ヒラギノ角ゴ Pro W3" charset="-128"/>
               </a:defRPr>
             </a:lvl2pPr>
-            <a:lvl3pPr marL="1143000" indent="-228600" defTabSz="2141538" eaLnBrk="0" hangingPunct="0">
-              <a:defRPr sz="2400">
+            <a:lvl3pPr marL="515722" indent="-103144" defTabSz="966262" eaLnBrk="0" hangingPunct="0">
+              <a:defRPr sz="1100">
                 <a:solidFill>
                   <a:schemeClr val="tx1"/>
                 </a:solidFill>
@@ -864,8 +864,8 @@
                 <a:ea typeface="ヒラギノ角ゴ Pro W3" charset="-128"/>
               </a:defRPr>
             </a:lvl3pPr>
-            <a:lvl4pPr marL="1600200" indent="-228600" defTabSz="2141538" eaLnBrk="0" hangingPunct="0">
-              <a:defRPr sz="2400">
+            <a:lvl4pPr marL="722010" indent="-103144" defTabSz="966262" eaLnBrk="0" hangingPunct="0">
+              <a:defRPr sz="1100">
                 <a:solidFill>
                   <a:schemeClr val="tx1"/>
                 </a:solidFill>
@@ -873,8 +873,8 @@
                 <a:ea typeface="ヒラギノ角ゴ Pro W3" charset="-128"/>
               </a:defRPr>
             </a:lvl4pPr>
-            <a:lvl5pPr marL="2057400" indent="-228600" defTabSz="2141538" eaLnBrk="0" hangingPunct="0">
-              <a:defRPr sz="2400">
+            <a:lvl5pPr marL="928299" indent="-103144" defTabSz="966262" eaLnBrk="0" hangingPunct="0">
+              <a:defRPr sz="1100">
                 <a:solidFill>
                   <a:schemeClr val="tx1"/>
                 </a:solidFill>
@@ -882,14 +882,14 @@
                 <a:ea typeface="ヒラギノ角ゴ Pro W3" charset="-128"/>
               </a:defRPr>
             </a:lvl5pPr>
-            <a:lvl6pPr marL="2514600" indent="-228600" defTabSz="2141538" eaLnBrk="0" fontAlgn="base" hangingPunct="0">
+            <a:lvl6pPr marL="1134588" indent="-103144" defTabSz="966262" eaLnBrk="0" fontAlgn="base" hangingPunct="0">
               <a:spcBef>
                 <a:spcPct val="0"/>
               </a:spcBef>
               <a:spcAft>
                 <a:spcPct val="0"/>
               </a:spcAft>
-              <a:defRPr sz="2400">
+              <a:defRPr sz="1100">
                 <a:solidFill>
                   <a:schemeClr val="tx1"/>
                 </a:solidFill>
@@ -897,14 +897,14 @@
                 <a:ea typeface="ヒラギノ角ゴ Pro W3" charset="-128"/>
               </a:defRPr>
             </a:lvl6pPr>
-            <a:lvl7pPr marL="2971800" indent="-228600" defTabSz="2141538" eaLnBrk="0" fontAlgn="base" hangingPunct="0">
+            <a:lvl7pPr marL="1340876" indent="-103144" defTabSz="966262" eaLnBrk="0" fontAlgn="base" hangingPunct="0">
               <a:spcBef>
                 <a:spcPct val="0"/>
               </a:spcBef>
               <a:spcAft>
                 <a:spcPct val="0"/>
               </a:spcAft>
-              <a:defRPr sz="2400">
+              <a:defRPr sz="1100">
                 <a:solidFill>
                   <a:schemeClr val="tx1"/>
                 </a:solidFill>
@@ -912,14 +912,14 @@
                 <a:ea typeface="ヒラギノ角ゴ Pro W3" charset="-128"/>
               </a:defRPr>
             </a:lvl7pPr>
-            <a:lvl8pPr marL="3429000" indent="-228600" defTabSz="2141538" eaLnBrk="0" fontAlgn="base" hangingPunct="0">
+            <a:lvl8pPr marL="1547165" indent="-103144" defTabSz="966262" eaLnBrk="0" fontAlgn="base" hangingPunct="0">
               <a:spcBef>
                 <a:spcPct val="0"/>
               </a:spcBef>
               <a:spcAft>
                 <a:spcPct val="0"/>
               </a:spcAft>
-              <a:defRPr sz="2400">
+              <a:defRPr sz="1100">
                 <a:solidFill>
                   <a:schemeClr val="tx1"/>
                 </a:solidFill>
@@ -927,14 +927,14 @@
                 <a:ea typeface="ヒラギノ角ゴ Pro W3" charset="-128"/>
               </a:defRPr>
             </a:lvl8pPr>
-            <a:lvl9pPr marL="3886200" indent="-228600" defTabSz="2141538" eaLnBrk="0" fontAlgn="base" hangingPunct="0">
+            <a:lvl9pPr marL="1753453" indent="-103144" defTabSz="966262" eaLnBrk="0" fontAlgn="base" hangingPunct="0">
               <a:spcBef>
                 <a:spcPct val="0"/>
               </a:spcBef>
               <a:spcAft>
                 <a:spcPct val="0"/>
               </a:spcAft>
-              <a:defRPr sz="2400">
+              <a:defRPr sz="1100">
                 <a:solidFill>
                   <a:schemeClr val="tx1"/>
                 </a:solidFill>
@@ -945,11 +945,11 @@
           </a:lstStyle>
           <a:p>
             <a:fld id="{A0694AF9-558D-CF42-8F40-67FB97006EED}" type="slidenum">
-              <a:rPr lang="en-US" altLang="en-US" sz="2800"/>
+              <a:rPr lang="en-US" altLang="en-US" sz="1300"/>
               <a:pPr/>
               <a:t>1</a:t>
             </a:fld>
-            <a:endParaRPr lang="en-US" altLang="en-US" sz="2800"/>
+            <a:endParaRPr lang="en-US" altLang="en-US" sz="1300"/>
           </a:p>
         </p:txBody>
       </p:sp>
@@ -2363,24 +2363,33 @@
             <a:endParaRPr lang="en-US" dirty="0"/>
           </a:p>
           <a:p>
+            <a:pPr algn="ctr"/>
+            <a:r>
+              <a:rPr lang="en-US" b="1" dirty="0"/>
+              <a:t>Project Background</a:t>
+            </a:r>
+          </a:p>
+          <a:p>
             <a:r>
               <a:rPr lang="en-US" dirty="0"/>
-              <a:t>Project Background:</a:t>
-            </a:r>
+              <a:t>	Using Python and TensorFlow to classify a large traffic sign dataset using a convolutional neural network (CNN)</a:t>
+            </a:r>
+          </a:p>
+          <a:p>
+            <a:endParaRPr lang="en-US" dirty="0"/>
           </a:p>
           <a:p>
             <a:r>
               <a:rPr lang="en-US" dirty="0"/>
-              <a:t>	Using Machine Learning and Artificial Intelligence to classify a large traffic sign dataset using a convolutional neural network (CNN)</a:t>
-            </a:r>
-          </a:p>
-          <a:p>
-            <a:endParaRPr lang="en-US" dirty="0"/>
-          </a:p>
-          <a:p>
+              <a:t>	</a:t>
+            </a:r>
+            <a:r>
+              <a:rPr lang="en-US" u="sng" dirty="0"/>
+              <a:t>Adversarial Phase</a:t>
+            </a:r>
             <a:r>
               <a:rPr lang="en-US" dirty="0"/>
-              <a:t>	Adversarial Phase: manipulate images within dataset to test vulnerabilities of machine learning and our CNN model and ensure accuracy</a:t>
+              <a:t>: manipulate images within dataset to test vulnerabilities of machine learning and our CNN model and ensure accuracy</a:t>
             </a:r>
           </a:p>
           <a:p>
@@ -2405,8 +2414,8 @@
         </p:nvSpPr>
         <p:spPr>
           <a:xfrm>
-            <a:off x="297180" y="21002587"/>
-            <a:ext cx="13914120" cy="10433625"/>
+            <a:off x="182880" y="15747674"/>
+            <a:ext cx="13914120" cy="12649617"/>
           </a:xfrm>
           <a:prstGeom prst="rect">
             <a:avLst/>
@@ -2419,10 +2428,12 @@
           </a:bodyPr>
           <a:lstStyle/>
           <a:p>
-            <a:r>
-              <a:rPr lang="en-US" dirty="0"/>
-              <a:t>Sample Images from the dataset:</a:t>
-            </a:r>
+            <a:pPr algn="ctr"/>
+            <a:r>
+              <a:rPr lang="en-US" b="1" dirty="0"/>
+              <a:t>Sample Images from the dataset</a:t>
+            </a:r>
+            <a:endParaRPr lang="en-US" dirty="0"/>
           </a:p>
           <a:p>
             <a:endParaRPr lang="en-US" sz="4800" kern="1200" dirty="0">
@@ -2460,9 +2471,10 @@
             <a:endParaRPr lang="en-US" dirty="0"/>
           </a:p>
           <a:p>
-            <a:r>
-              <a:rPr lang="en-US" dirty="0"/>
-              <a:t>Data Processing:</a:t>
+            <a:pPr algn="ctr"/>
+            <a:r>
+              <a:rPr lang="en-US" b="1" dirty="0"/>
+              <a:t>Data Processing</a:t>
             </a:r>
           </a:p>
           <a:p>
@@ -2481,6 +2493,18 @@
             <a:r>
               <a:rPr lang="en-US" dirty="0"/>
               <a:t>	Images were upscaled by padding or downscaled</a:t>
+            </a:r>
+          </a:p>
+          <a:p>
+            <a:r>
+              <a:rPr lang="en-US" dirty="0"/>
+              <a:t>	Used a Binary Classification System with respect to number of unique classes</a:t>
+            </a:r>
+          </a:p>
+          <a:p>
+            <a:r>
+              <a:rPr lang="en-US" dirty="0"/>
+              <a:t>	</a:t>
             </a:r>
           </a:p>
           <a:p>
@@ -2526,7 +2550,7 @@
         </p:blipFill>
         <p:spPr bwMode="auto">
           <a:xfrm>
-            <a:off x="297180" y="21968779"/>
+            <a:off x="297180" y="16691929"/>
             <a:ext cx="2409598" cy="2409598"/>
           </a:xfrm>
           <a:prstGeom prst="rect">
@@ -2573,7 +2597,7 @@
         </p:blipFill>
         <p:spPr bwMode="auto">
           <a:xfrm>
-            <a:off x="3219407" y="21968779"/>
+            <a:off x="3209882" y="16730029"/>
             <a:ext cx="2250723" cy="2409598"/>
           </a:xfrm>
           <a:prstGeom prst="rect">
@@ -2620,7 +2644,7 @@
         </p:blipFill>
         <p:spPr bwMode="auto">
           <a:xfrm>
-            <a:off x="5960903" y="21968779"/>
+            <a:off x="5999003" y="16691927"/>
             <a:ext cx="2586673" cy="2483207"/>
           </a:xfrm>
           <a:prstGeom prst="rect">
@@ -2666,9 +2690,10 @@
           </a:bodyPr>
           <a:lstStyle/>
           <a:p>
-            <a:r>
-              <a:rPr lang="en-US" dirty="0"/>
-              <a:t>Creating the Neural Network:</a:t>
+            <a:pPr algn="ctr"/>
+            <a:r>
+              <a:rPr lang="en-US" b="1" dirty="0"/>
+              <a:t>Creating the Neural Network</a:t>
             </a:r>
           </a:p>
           <a:p>
@@ -2686,7 +2711,7 @@
           <a:p>
             <a:r>
               <a:rPr lang="en-US" dirty="0"/>
-              <a:t>	Centered around the Estimator API and TensorFlow</a:t>
+              <a:t>	Centered around TensorFlow and Estimator API</a:t>
             </a:r>
           </a:p>
           <a:p>
@@ -2756,21 +2781,38 @@
             <a:endParaRPr lang="en-US" dirty="0"/>
           </a:p>
           <a:p>
+            <a:pPr algn="ctr"/>
+            <a:r>
+              <a:rPr lang="en-US" b="1" dirty="0"/>
+              <a:t>Key features of CNN</a:t>
+            </a:r>
+          </a:p>
+          <a:p>
             <a:r>
               <a:rPr lang="en-US" dirty="0"/>
-              <a:t>Key features of CNN:</a:t>
-            </a:r>
-          </a:p>
-          <a:p>
+              <a:t>	</a:t>
+            </a:r>
+            <a:r>
+              <a:rPr lang="en-US" u="sng" dirty="0"/>
+              <a:t>Dropout</a:t>
+            </a:r>
             <a:r>
               <a:rPr lang="en-US" dirty="0"/>
-              <a:t>	Dropout: Randomly ignoring neuron nodes during the training phase to prevent overfitting</a:t>
+              <a:t>: Randomly ignoring neuron nodes during the training phase to prevent overfitting</a:t>
             </a:r>
           </a:p>
           <a:p>
             <a:r>
               <a:rPr lang="en-US" dirty="0"/>
-              <a:t>	Estimator API: Allows for high-level implementation of machine learning model	</a:t>
+              <a:t>	</a:t>
+            </a:r>
+            <a:r>
+              <a:rPr lang="en-US" u="sng" dirty="0"/>
+              <a:t>Estimator API</a:t>
+            </a:r>
+            <a:r>
+              <a:rPr lang="en-US" dirty="0"/>
+              <a:t>: Allows for high-level implementation of machine learning model	</a:t>
             </a:r>
           </a:p>
           <a:p>
@@ -2828,7 +2870,7 @@
         <p:spPr>
           <a:xfrm>
             <a:off x="29962222" y="5932165"/>
-            <a:ext cx="13218102" cy="22252245"/>
+            <a:ext cx="13218102" cy="17081599"/>
           </a:xfrm>
           <a:prstGeom prst="rect">
             <a:avLst/>
@@ -2840,9 +2882,10 @@
           </a:bodyPr>
           <a:lstStyle/>
           <a:p>
-            <a:r>
-              <a:rPr lang="en-US" dirty="0"/>
-              <a:t>Training and Testing Neural Network:</a:t>
+            <a:pPr algn="ctr"/>
+            <a:r>
+              <a:rPr lang="en-US" b="1" dirty="0"/>
+              <a:t>Training and Testing Neural Network</a:t>
             </a:r>
           </a:p>
           <a:p>
@@ -2909,43 +2952,14 @@
             <a:endParaRPr lang="en-US" dirty="0"/>
           </a:p>
           <a:p>
+            <a:pPr algn="ctr"/>
+            <a:r>
+              <a:rPr lang="en-US" b="1" dirty="0"/>
+              <a:t>Adversarial Phase</a:t>
+            </a:r>
+          </a:p>
+          <a:p>
             <a:endParaRPr lang="en-US" dirty="0"/>
-          </a:p>
-          <a:p>
-            <a:r>
-              <a:rPr lang="en-US" dirty="0"/>
-              <a:t>Adversarial Phase:</a:t>
-            </a:r>
-          </a:p>
-          <a:p>
-            <a:r>
-              <a:rPr lang="en-US" dirty="0"/>
-              <a:t>	Gaussian noise for image manipulation</a:t>
-            </a:r>
-          </a:p>
-          <a:p>
-            <a:r>
-              <a:rPr lang="en-US" dirty="0"/>
-              <a:t>Results of Adversarial Phase:</a:t>
-            </a:r>
-          </a:p>
-          <a:p>
-            <a:r>
-              <a:rPr lang="en-US" dirty="0"/>
-              <a:t>	(show result when fed back into CNN for testing)</a:t>
-            </a:r>
-          </a:p>
-          <a:p>
-            <a:r>
-              <a:rPr lang="en-US" dirty="0"/>
-              <a:t>	(Another histogram plotting the results)</a:t>
-            </a:r>
-          </a:p>
-          <a:p>
-            <a:r>
-              <a:rPr lang="en-US" dirty="0"/>
-              <a:t>	</a:t>
-            </a:r>
           </a:p>
         </p:txBody>
       </p:sp>
@@ -3053,7 +3067,7 @@
         </p:blipFill>
         <p:spPr>
           <a:xfrm>
-            <a:off x="14341285" y="11261080"/>
+            <a:off x="14341285" y="10460980"/>
             <a:ext cx="14910059" cy="5458146"/>
           </a:xfrm>
           <a:prstGeom prst="rect">
@@ -3075,7 +3089,7 @@
         </p:nvSpPr>
         <p:spPr>
           <a:xfrm>
-            <a:off x="14211298" y="16926484"/>
+            <a:off x="14211298" y="16316884"/>
             <a:ext cx="15303871" cy="707886"/>
           </a:xfrm>
           <a:prstGeom prst="rect">
@@ -3089,9 +3103,10 @@
           </a:bodyPr>
           <a:lstStyle/>
           <a:p>
+            <a:pPr algn="ctr"/>
             <a:r>
               <a:rPr lang="en-US" sz="4000" dirty="0"/>
-              <a:t>Figure 1. Simple Image showing “under the hood” structure of CNN</a:t>
+              <a:t>Figure 1.“Under the Hood” structure of the CNN</a:t>
             </a:r>
           </a:p>
         </p:txBody>
@@ -3125,7 +3140,7 @@
         </p:blipFill>
         <p:spPr bwMode="auto">
           <a:xfrm>
-            <a:off x="9147286" y="21968777"/>
+            <a:off x="9099661" y="16691927"/>
             <a:ext cx="1500272" cy="2483209"/>
           </a:xfrm>
           <a:prstGeom prst="rect">
@@ -3172,7 +3187,7 @@
         </p:blipFill>
         <p:spPr bwMode="auto">
           <a:xfrm>
-            <a:off x="11035134" y="21968777"/>
+            <a:off x="11111334" y="16710977"/>
             <a:ext cx="2483209" cy="2483209"/>
           </a:xfrm>
           <a:prstGeom prst="rect">
@@ -3212,8 +3227,8 @@
         </p:blipFill>
         <p:spPr>
           <a:xfrm>
-            <a:off x="29608150" y="8294155"/>
-            <a:ext cx="13787750" cy="5325592"/>
+            <a:off x="29678982" y="8350947"/>
+            <a:ext cx="14212215" cy="5489544"/>
           </a:xfrm>
           <a:prstGeom prst="rect">
             <a:avLst/>
@@ -3234,7 +3249,7 @@
         </p:nvSpPr>
         <p:spPr>
           <a:xfrm>
-            <a:off x="29973911" y="13753140"/>
+            <a:off x="29973911" y="13943640"/>
             <a:ext cx="14008730" cy="707886"/>
           </a:xfrm>
           <a:prstGeom prst="rect">
@@ -3251,7 +3266,7 @@
             <a:pPr algn="ctr"/>
             <a:r>
               <a:rPr lang="en-US" sz="4000" dirty="0"/>
-              <a:t>Figure 3. Accuracy vs. Number of Images trained</a:t>
+              <a:t>Figure 3. Accuracy vs. Number of steps</a:t>
             </a:r>
           </a:p>
         </p:txBody>
@@ -3278,8 +3293,8 @@
         </p:blipFill>
         <p:spPr>
           <a:xfrm>
-            <a:off x="29678983" y="14470252"/>
-            <a:ext cx="13540162" cy="5922939"/>
+            <a:off x="29678983" y="14584552"/>
+            <a:ext cx="14008730" cy="6127907"/>
           </a:xfrm>
           <a:prstGeom prst="rect">
             <a:avLst/>
@@ -3300,7 +3315,7 @@
         </p:nvSpPr>
         <p:spPr>
           <a:xfrm>
-            <a:off x="29779001" y="21002587"/>
+            <a:off x="29779001" y="20621587"/>
             <a:ext cx="14008730" cy="707886"/>
           </a:xfrm>
           <a:prstGeom prst="rect">
@@ -3317,7 +3332,7 @@
             <a:pPr algn="ctr"/>
             <a:r>
               <a:rPr lang="en-US" sz="4000" dirty="0"/>
-              <a:t>Figure 4. Computed loss vs. Number of Images trained</a:t>
+              <a:t>Figure 4. Computed loss vs. Number of steps</a:t>
             </a:r>
           </a:p>
         </p:txBody>
@@ -3344,7 +3359,7 @@
         </p:blipFill>
         <p:spPr>
           <a:xfrm>
-            <a:off x="14211295" y="17634370"/>
+            <a:off x="14592295" y="17062870"/>
             <a:ext cx="13221168" cy="8461548"/>
           </a:xfrm>
           <a:prstGeom prst="rect">
@@ -3366,7 +3381,7 @@
         </p:nvSpPr>
         <p:spPr>
           <a:xfrm>
-            <a:off x="14118318" y="25332935"/>
+            <a:off x="14118318" y="24837635"/>
             <a:ext cx="15396851" cy="707886"/>
           </a:xfrm>
           <a:prstGeom prst="rect">
@@ -3384,6 +3399,291 @@
             <a:r>
               <a:rPr lang="en-US" sz="4000" dirty="0"/>
               <a:t>Figure 2. Output of filters of the primary layer</a:t>
+            </a:r>
+          </a:p>
+        </p:txBody>
+      </p:sp>
+      <p:sp>
+        <p:nvSpPr>
+          <p:cNvPr id="4" name="TextBox 3">
+            <a:extLst>
+              <a:ext uri="{FF2B5EF4-FFF2-40B4-BE49-F238E27FC236}">
+                <a16:creationId xmlns:a16="http://schemas.microsoft.com/office/drawing/2014/main" id="{39EC144C-C2C3-4B1A-85E7-5E2B19CB7F79}"/>
+              </a:ext>
+            </a:extLst>
+          </p:cNvPr>
+          <p:cNvSpPr txBox="1"/>
+          <p:nvPr/>
+        </p:nvSpPr>
+        <p:spPr>
+          <a:xfrm>
+            <a:off x="182880" y="27256985"/>
+            <a:ext cx="13650292" cy="2554545"/>
+          </a:xfrm>
+          <a:prstGeom prst="rect">
+            <a:avLst/>
+          </a:prstGeom>
+          <a:noFill/>
+        </p:spPr>
+        <p:txBody>
+          <a:bodyPr wrap="square" rtlCol="0">
+            <a:spAutoFit/>
+          </a:bodyPr>
+          <a:lstStyle/>
+          <a:p>
+            <a:pPr algn="ctr"/>
+            <a:r>
+              <a:rPr lang="en-US" b="1" dirty="0"/>
+              <a:t>References</a:t>
+            </a:r>
+          </a:p>
+          <a:p>
+            <a:r>
+              <a:rPr lang="en-US" sz="2800" dirty="0"/>
+              <a:t>1. Andreas </a:t>
+            </a:r>
+            <a:r>
+              <a:rPr lang="en-US" sz="2800" dirty="0" err="1"/>
+              <a:t>Møgelmose</a:t>
+            </a:r>
+            <a:r>
+              <a:rPr lang="en-US" sz="2800" dirty="0"/>
+              <a:t>, Mohan M. Trivedi, and Thomas B. </a:t>
+            </a:r>
+            <a:r>
+              <a:rPr lang="en-US" sz="2800" dirty="0" err="1"/>
+              <a:t>Moeslund</a:t>
+            </a:r>
+            <a:r>
+              <a:rPr lang="en-US" sz="2800" dirty="0"/>
+              <a:t>, "Vision based Traffic Sign Detection and Analysis for Intelligent Driver Assistance Systems: Perspectives and Survey," </a:t>
+            </a:r>
+            <a:r>
+              <a:rPr lang="en-US" sz="2800" i="1" dirty="0"/>
+              <a:t>IEEE Transactions on Intelligent Transportation Systems,</a:t>
+            </a:r>
+            <a:r>
+              <a:rPr lang="en-US" sz="2800" dirty="0"/>
+              <a:t> 2012.</a:t>
+            </a:r>
+          </a:p>
+        </p:txBody>
+      </p:sp>
+      <p:pic>
+        <p:nvPicPr>
+          <p:cNvPr id="20" name="Picture 19">
+            <a:extLst>
+              <a:ext uri="{FF2B5EF4-FFF2-40B4-BE49-F238E27FC236}">
+                <a16:creationId xmlns:a16="http://schemas.microsoft.com/office/drawing/2014/main" id="{295C29F2-619C-4DE1-A7D2-475F18F78790}"/>
+              </a:ext>
+            </a:extLst>
+          </p:cNvPr>
+          <p:cNvPicPr>
+            <a:picLocks noChangeAspect="1"/>
+          </p:cNvPicPr>
+          <p:nvPr/>
+        </p:nvPicPr>
+        <p:blipFill>
+          <a:blip r:embed="rId13"/>
+          <a:stretch>
+            <a:fillRect/>
+          </a:stretch>
+        </p:blipFill>
+        <p:spPr>
+          <a:xfrm>
+            <a:off x="29962218" y="22341219"/>
+            <a:ext cx="3309721" cy="3502521"/>
+          </a:xfrm>
+          <a:prstGeom prst="rect">
+            <a:avLst/>
+          </a:prstGeom>
+        </p:spPr>
+      </p:pic>
+      <p:pic>
+        <p:nvPicPr>
+          <p:cNvPr id="25" name="Picture 24">
+            <a:extLst>
+              <a:ext uri="{FF2B5EF4-FFF2-40B4-BE49-F238E27FC236}">
+                <a16:creationId xmlns:a16="http://schemas.microsoft.com/office/drawing/2014/main" id="{CF5F5E84-6B5B-40E6-A650-DA72F0CC27E0}"/>
+              </a:ext>
+            </a:extLst>
+          </p:cNvPr>
+          <p:cNvPicPr>
+            <a:picLocks noChangeAspect="1"/>
+          </p:cNvPicPr>
+          <p:nvPr/>
+        </p:nvPicPr>
+        <p:blipFill>
+          <a:blip r:embed="rId14"/>
+          <a:stretch>
+            <a:fillRect/>
+          </a:stretch>
+        </p:blipFill>
+        <p:spPr>
+          <a:xfrm>
+            <a:off x="34506680" y="22407720"/>
+            <a:ext cx="3442995" cy="3458574"/>
+          </a:xfrm>
+          <a:prstGeom prst="rect">
+            <a:avLst/>
+          </a:prstGeom>
+        </p:spPr>
+      </p:pic>
+      <p:pic>
+        <p:nvPicPr>
+          <p:cNvPr id="30" name="Picture 29">
+            <a:extLst>
+              <a:ext uri="{FF2B5EF4-FFF2-40B4-BE49-F238E27FC236}">
+                <a16:creationId xmlns:a16="http://schemas.microsoft.com/office/drawing/2014/main" id="{21A23B7F-B092-491C-B9CB-C7407F9C398C}"/>
+              </a:ext>
+            </a:extLst>
+          </p:cNvPr>
+          <p:cNvPicPr>
+            <a:picLocks noChangeAspect="1"/>
+          </p:cNvPicPr>
+          <p:nvPr/>
+        </p:nvPicPr>
+        <p:blipFill>
+          <a:blip r:embed="rId15"/>
+          <a:stretch>
+            <a:fillRect/>
+          </a:stretch>
+        </p:blipFill>
+        <p:spPr>
+          <a:xfrm>
+            <a:off x="39329843" y="22396245"/>
+            <a:ext cx="3442992" cy="3459625"/>
+          </a:xfrm>
+          <a:prstGeom prst="rect">
+            <a:avLst/>
+          </a:prstGeom>
+        </p:spPr>
+      </p:pic>
+      <p:sp>
+        <p:nvSpPr>
+          <p:cNvPr id="31" name="TextBox 30">
+            <a:extLst>
+              <a:ext uri="{FF2B5EF4-FFF2-40B4-BE49-F238E27FC236}">
+                <a16:creationId xmlns:a16="http://schemas.microsoft.com/office/drawing/2014/main" id="{C1D7EBAF-B845-424C-9DDD-E4A6D2AA2634}"/>
+              </a:ext>
+            </a:extLst>
+          </p:cNvPr>
+          <p:cNvSpPr txBox="1"/>
+          <p:nvPr/>
+        </p:nvSpPr>
+        <p:spPr>
+          <a:xfrm>
+            <a:off x="29664795" y="26101965"/>
+            <a:ext cx="3901988" cy="2246769"/>
+          </a:xfrm>
+          <a:prstGeom prst="rect">
+            <a:avLst/>
+          </a:prstGeom>
+          <a:noFill/>
+        </p:spPr>
+        <p:txBody>
+          <a:bodyPr wrap="square" rtlCol="0">
+            <a:spAutoFit/>
+          </a:bodyPr>
+          <a:lstStyle/>
+          <a:p>
+            <a:pPr algn="ctr"/>
+            <a:r>
+              <a:rPr lang="en-US" sz="4400" dirty="0"/>
+              <a:t>Original</a:t>
+            </a:r>
+          </a:p>
+          <a:p>
+            <a:pPr algn="ctr"/>
+            <a:r>
+              <a:rPr lang="en-US" dirty="0"/>
+              <a:t>Result: Stop Sign</a:t>
+            </a:r>
+          </a:p>
+        </p:txBody>
+      </p:sp>
+      <p:sp>
+        <p:nvSpPr>
+          <p:cNvPr id="38" name="TextBox 37">
+            <a:extLst>
+              <a:ext uri="{FF2B5EF4-FFF2-40B4-BE49-F238E27FC236}">
+                <a16:creationId xmlns:a16="http://schemas.microsoft.com/office/drawing/2014/main" id="{810325FC-6CCE-4CF0-A9EB-EAD98250A7D8}"/>
+              </a:ext>
+            </a:extLst>
+          </p:cNvPr>
+          <p:cNvSpPr txBox="1"/>
+          <p:nvPr/>
+        </p:nvSpPr>
+        <p:spPr>
+          <a:xfrm>
+            <a:off x="34174447" y="26121361"/>
+            <a:ext cx="4112486" cy="2246769"/>
+          </a:xfrm>
+          <a:prstGeom prst="rect">
+            <a:avLst/>
+          </a:prstGeom>
+          <a:noFill/>
+        </p:spPr>
+        <p:txBody>
+          <a:bodyPr wrap="square" rtlCol="0">
+            <a:spAutoFit/>
+          </a:bodyPr>
+          <a:lstStyle/>
+          <a:p>
+            <a:pPr algn="ctr"/>
+            <a:r>
+              <a:rPr lang="en-US" sz="4400" dirty="0"/>
+              <a:t>Blurred 70%</a:t>
+            </a:r>
+          </a:p>
+          <a:p>
+            <a:pPr algn="ctr"/>
+            <a:r>
+              <a:rPr lang="en-US" dirty="0"/>
+              <a:t>Result: Stop Sign</a:t>
+            </a:r>
+          </a:p>
+        </p:txBody>
+      </p:sp>
+      <p:sp>
+        <p:nvSpPr>
+          <p:cNvPr id="39" name="TextBox 38">
+            <a:extLst>
+              <a:ext uri="{FF2B5EF4-FFF2-40B4-BE49-F238E27FC236}">
+                <a16:creationId xmlns:a16="http://schemas.microsoft.com/office/drawing/2014/main" id="{655B06F9-91BB-49EE-B966-89BDA5E73EF6}"/>
+              </a:ext>
+            </a:extLst>
+          </p:cNvPr>
+          <p:cNvSpPr txBox="1"/>
+          <p:nvPr/>
+        </p:nvSpPr>
+        <p:spPr>
+          <a:xfrm>
+            <a:off x="38531801" y="26121361"/>
+            <a:ext cx="4800593" cy="2246769"/>
+          </a:xfrm>
+          <a:prstGeom prst="rect">
+            <a:avLst/>
+          </a:prstGeom>
+          <a:noFill/>
+        </p:spPr>
+        <p:txBody>
+          <a:bodyPr wrap="square" rtlCol="0">
+            <a:spAutoFit/>
+          </a:bodyPr>
+          <a:lstStyle/>
+          <a:p>
+            <a:pPr algn="ctr"/>
+            <a:r>
+              <a:rPr lang="en-US" sz="4400" dirty="0"/>
+              <a:t>Salt and Pepper</a:t>
+            </a:r>
+          </a:p>
+          <a:p>
+            <a:pPr algn="ctr"/>
+            <a:r>
+              <a:rPr lang="en-US" dirty="0"/>
+              <a:t>Result: Not a Stop Sign</a:t>
             </a:r>
           </a:p>
         </p:txBody>

</xml_diff>